<commit_message>
README file created - missing the Heroku link
</commit_message>
<xml_diff>
--- a/Burger_MVC.pptx
+++ b/Burger_MVC.pptx
@@ -107,6 +107,11 @@
       </a:defRPr>
     </a:lvl9pPr>
   </p:defaultTextStyle>
+  <p:extLst>
+    <p:ext uri="{EFAFB233-063F-42B5-8137-9DF3F51BA10A}">
+      <p15:sldGuideLst xmlns:p15="http://schemas.microsoft.com/office/powerpoint/2012/main"/>
+    </p:ext>
+  </p:extLst>
 </p:presentation>
 </file>
 
@@ -192,7 +197,7 @@
           <a:p>
             <a:fld id="{FE08E006-A2E1-394B-95F5-CD92FD40C0E6}" type="datetimeFigureOut">
               <a:rPr lang="en-MX" smtClean="0"/>
-              <a:t>7/7/20</a:t>
+              <a:t>7/8/20</a:t>
             </a:fld>
             <a:endParaRPr lang="en-MX"/>
           </a:p>
@@ -693,7 +698,7 @@
           <a:p>
             <a:fld id="{760BDB9D-A4FD-5549-AF87-1291292824F6}" type="datetimeFigureOut">
               <a:rPr lang="en-MX" smtClean="0"/>
-              <a:t>7/7/20</a:t>
+              <a:t>7/8/20</a:t>
             </a:fld>
             <a:endParaRPr lang="en-MX"/>
           </a:p>
@@ -893,7 +898,7 @@
           <a:p>
             <a:fld id="{760BDB9D-A4FD-5549-AF87-1291292824F6}" type="datetimeFigureOut">
               <a:rPr lang="en-MX" smtClean="0"/>
-              <a:t>7/7/20</a:t>
+              <a:t>7/8/20</a:t>
             </a:fld>
             <a:endParaRPr lang="en-MX"/>
           </a:p>
@@ -1103,7 +1108,7 @@
           <a:p>
             <a:fld id="{760BDB9D-A4FD-5549-AF87-1291292824F6}" type="datetimeFigureOut">
               <a:rPr lang="en-MX" smtClean="0"/>
-              <a:t>7/7/20</a:t>
+              <a:t>7/8/20</a:t>
             </a:fld>
             <a:endParaRPr lang="en-MX"/>
           </a:p>
@@ -1303,7 +1308,7 @@
           <a:p>
             <a:fld id="{760BDB9D-A4FD-5549-AF87-1291292824F6}" type="datetimeFigureOut">
               <a:rPr lang="en-MX" smtClean="0"/>
-              <a:t>7/7/20</a:t>
+              <a:t>7/8/20</a:t>
             </a:fld>
             <a:endParaRPr lang="en-MX"/>
           </a:p>
@@ -1579,7 +1584,7 @@
           <a:p>
             <a:fld id="{760BDB9D-A4FD-5549-AF87-1291292824F6}" type="datetimeFigureOut">
               <a:rPr lang="en-MX" smtClean="0"/>
-              <a:t>7/7/20</a:t>
+              <a:t>7/8/20</a:t>
             </a:fld>
             <a:endParaRPr lang="en-MX"/>
           </a:p>
@@ -1847,7 +1852,7 @@
           <a:p>
             <a:fld id="{760BDB9D-A4FD-5549-AF87-1291292824F6}" type="datetimeFigureOut">
               <a:rPr lang="en-MX" smtClean="0"/>
-              <a:t>7/7/20</a:t>
+              <a:t>7/8/20</a:t>
             </a:fld>
             <a:endParaRPr lang="en-MX"/>
           </a:p>
@@ -2262,7 +2267,7 @@
           <a:p>
             <a:fld id="{760BDB9D-A4FD-5549-AF87-1291292824F6}" type="datetimeFigureOut">
               <a:rPr lang="en-MX" smtClean="0"/>
-              <a:t>7/7/20</a:t>
+              <a:t>7/8/20</a:t>
             </a:fld>
             <a:endParaRPr lang="en-MX"/>
           </a:p>
@@ -2404,7 +2409,7 @@
           <a:p>
             <a:fld id="{760BDB9D-A4FD-5549-AF87-1291292824F6}" type="datetimeFigureOut">
               <a:rPr lang="en-MX" smtClean="0"/>
-              <a:t>7/7/20</a:t>
+              <a:t>7/8/20</a:t>
             </a:fld>
             <a:endParaRPr lang="en-MX"/>
           </a:p>
@@ -2517,7 +2522,7 @@
           <a:p>
             <a:fld id="{760BDB9D-A4FD-5549-AF87-1291292824F6}" type="datetimeFigureOut">
               <a:rPr lang="en-MX" smtClean="0"/>
-              <a:t>7/7/20</a:t>
+              <a:t>7/8/20</a:t>
             </a:fld>
             <a:endParaRPr lang="en-MX"/>
           </a:p>
@@ -2830,7 +2835,7 @@
           <a:p>
             <a:fld id="{760BDB9D-A4FD-5549-AF87-1291292824F6}" type="datetimeFigureOut">
               <a:rPr lang="en-MX" smtClean="0"/>
-              <a:t>7/7/20</a:t>
+              <a:t>7/8/20</a:t>
             </a:fld>
             <a:endParaRPr lang="en-MX"/>
           </a:p>
@@ -3119,7 +3124,7 @@
           <a:p>
             <a:fld id="{760BDB9D-A4FD-5549-AF87-1291292824F6}" type="datetimeFigureOut">
               <a:rPr lang="en-MX" smtClean="0"/>
-              <a:t>7/7/20</a:t>
+              <a:t>7/8/20</a:t>
             </a:fld>
             <a:endParaRPr lang="en-MX"/>
           </a:p>
@@ -3362,7 +3367,7 @@
           <a:p>
             <a:fld id="{760BDB9D-A4FD-5549-AF87-1291292824F6}" type="datetimeFigureOut">
               <a:rPr lang="en-MX" smtClean="0"/>
-              <a:t>7/7/20</a:t>
+              <a:t>7/8/20</a:t>
             </a:fld>
             <a:endParaRPr lang="en-MX"/>
           </a:p>
@@ -3793,8 +3798,8 @@
         </p:nvSpPr>
         <p:spPr>
           <a:xfrm>
-            <a:off x="1" y="0"/>
-            <a:ext cx="4004994" cy="6858000"/>
+            <a:off x="162153" y="0"/>
+            <a:ext cx="4583060" cy="6858000"/>
           </a:xfrm>
           <a:prstGeom prst="roundRect">
             <a:avLst>
@@ -3846,8 +3851,8 @@
         </p:nvSpPr>
         <p:spPr>
           <a:xfrm>
-            <a:off x="4093504" y="0"/>
-            <a:ext cx="4004994" cy="6858000"/>
+            <a:off x="4985348" y="0"/>
+            <a:ext cx="5242595" cy="6858000"/>
           </a:xfrm>
           <a:prstGeom prst="roundRect">
             <a:avLst>
@@ -3899,8 +3904,8 @@
         </p:nvSpPr>
         <p:spPr>
           <a:xfrm>
-            <a:off x="8187007" y="0"/>
-            <a:ext cx="4004994" cy="6858000"/>
+            <a:off x="10314753" y="0"/>
+            <a:ext cx="1877245" cy="6858000"/>
           </a:xfrm>
           <a:prstGeom prst="roundRect">
             <a:avLst>
@@ -3952,8 +3957,8 @@
         </p:nvSpPr>
         <p:spPr>
           <a:xfrm>
-            <a:off x="8098497" y="449608"/>
-            <a:ext cx="4093501" cy="6370975"/>
+            <a:off x="10229111" y="449608"/>
+            <a:ext cx="1485341" cy="6370975"/>
           </a:xfrm>
           <a:prstGeom prst="rect">
             <a:avLst/>
@@ -4346,7 +4351,7 @@
         </p:nvSpPr>
         <p:spPr>
           <a:xfrm>
-            <a:off x="-105696" y="449608"/>
+            <a:off x="634522" y="449608"/>
             <a:ext cx="4110689" cy="6370975"/>
           </a:xfrm>
           <a:prstGeom prst="rect">
@@ -5236,18 +5241,14 @@
         </p:nvSpPr>
         <p:spPr>
           <a:xfrm>
-            <a:off x="4004994" y="449608"/>
-            <a:ext cx="4093504" cy="6740307"/>
+            <a:off x="5535785" y="449608"/>
+            <a:ext cx="4382173" cy="6740307"/>
           </a:xfrm>
           <a:prstGeom prst="rect">
             <a:avLst/>
           </a:prstGeom>
           <a:ln>
-            <a:solidFill>
-              <a:schemeClr val="bg1">
-                <a:lumMod val="65000"/>
-              </a:schemeClr>
-            </a:solidFill>
+            <a:noFill/>
           </a:ln>
         </p:spPr>
         <p:txBody>
@@ -6900,7 +6901,7 @@
         </p:nvSpPr>
         <p:spPr>
           <a:xfrm>
-            <a:off x="4533417" y="1054323"/>
+            <a:off x="6064209" y="1054323"/>
             <a:ext cx="173621" cy="173621"/>
           </a:xfrm>
           <a:prstGeom prst="ellipse">
@@ -6954,7 +6955,7 @@
         </p:nvSpPr>
         <p:spPr>
           <a:xfrm>
-            <a:off x="4558843" y="3066514"/>
+            <a:off x="6089635" y="3066514"/>
             <a:ext cx="173621" cy="173621"/>
           </a:xfrm>
           <a:prstGeom prst="ellipse">
@@ -7012,7 +7013,7 @@
         </p:nvCxnSpPr>
         <p:spPr>
           <a:xfrm rot="10800000" flipH="1" flipV="1">
-            <a:off x="4533417" y="1141133"/>
+            <a:off x="6064209" y="1141133"/>
             <a:ext cx="25426" cy="2012191"/>
           </a:xfrm>
           <a:prstGeom prst="curvedConnector3">
@@ -7056,7 +7057,7 @@
         </p:nvSpPr>
         <p:spPr>
           <a:xfrm>
-            <a:off x="4537364" y="2147229"/>
+            <a:off x="6068156" y="2147229"/>
             <a:ext cx="173621" cy="173621"/>
           </a:xfrm>
           <a:prstGeom prst="ellipse">
@@ -7110,7 +7111,7 @@
         </p:nvSpPr>
         <p:spPr>
           <a:xfrm>
-            <a:off x="4261132" y="6560566"/>
+            <a:off x="5791924" y="6560566"/>
             <a:ext cx="173621" cy="173621"/>
           </a:xfrm>
           <a:prstGeom prst="ellipse">
@@ -7168,7 +7169,7 @@
         </p:nvCxnSpPr>
         <p:spPr>
           <a:xfrm rot="10800000" flipV="1">
-            <a:off x="4261132" y="2234039"/>
+            <a:off x="5791924" y="2234039"/>
             <a:ext cx="276232" cy="4413337"/>
           </a:xfrm>
           <a:prstGeom prst="curvedConnector3">
@@ -7212,7 +7213,7 @@
         </p:nvSpPr>
         <p:spPr>
           <a:xfrm>
-            <a:off x="4261128" y="6170246"/>
+            <a:off x="5791920" y="6170246"/>
             <a:ext cx="173621" cy="173621"/>
           </a:xfrm>
           <a:prstGeom prst="ellipse">
@@ -7266,7 +7267,7 @@
         </p:nvSpPr>
         <p:spPr>
           <a:xfrm>
-            <a:off x="4240628" y="5243281"/>
+            <a:off x="5771420" y="5243281"/>
             <a:ext cx="173621" cy="173621"/>
           </a:xfrm>
           <a:prstGeom prst="ellipse">
@@ -7324,7 +7325,7 @@
         </p:nvCxnSpPr>
         <p:spPr>
           <a:xfrm rot="10800000">
-            <a:off x="4240628" y="5330093"/>
+            <a:off x="5771420" y="5330093"/>
             <a:ext cx="20500" cy="926965"/>
           </a:xfrm>
           <a:prstGeom prst="curvedConnector3">
@@ -7368,7 +7369,7 @@
         </p:nvSpPr>
         <p:spPr>
           <a:xfrm>
-            <a:off x="4225626" y="4689860"/>
+            <a:off x="5756418" y="4689860"/>
             <a:ext cx="173621" cy="173621"/>
           </a:xfrm>
           <a:prstGeom prst="ellipse">
@@ -7422,7 +7423,7 @@
         </p:nvSpPr>
         <p:spPr>
           <a:xfrm>
-            <a:off x="4533417" y="4333041"/>
+            <a:off x="6064209" y="4333041"/>
             <a:ext cx="173621" cy="173621"/>
           </a:xfrm>
           <a:prstGeom prst="ellipse">
@@ -7480,7 +7481,7 @@
         </p:nvCxnSpPr>
         <p:spPr>
           <a:xfrm rot="10800000" flipH="1">
-            <a:off x="4225625" y="4419853"/>
+            <a:off x="5756417" y="4419853"/>
             <a:ext cx="307791" cy="356819"/>
           </a:xfrm>
           <a:prstGeom prst="curvedConnector3">
@@ -7524,7 +7525,7 @@
         </p:nvSpPr>
         <p:spPr>
           <a:xfrm>
-            <a:off x="613187" y="5806820"/>
+            <a:off x="1353405" y="5806820"/>
             <a:ext cx="173621" cy="173621"/>
           </a:xfrm>
           <a:prstGeom prst="ellipse">
@@ -7578,7 +7579,7 @@
         </p:nvSpPr>
         <p:spPr>
           <a:xfrm>
-            <a:off x="511374" y="2176921"/>
+            <a:off x="1251592" y="2176921"/>
             <a:ext cx="173621" cy="173621"/>
           </a:xfrm>
           <a:prstGeom prst="ellipse">
@@ -7636,7 +7637,7 @@
         </p:nvCxnSpPr>
         <p:spPr>
           <a:xfrm rot="10800000">
-            <a:off x="511375" y="2263733"/>
+            <a:off x="1251593" y="2263733"/>
             <a:ext cx="101813" cy="3629899"/>
           </a:xfrm>
           <a:prstGeom prst="curvedConnector3">
@@ -7680,7 +7681,7 @@
         </p:nvSpPr>
         <p:spPr>
           <a:xfrm>
-            <a:off x="613187" y="5983718"/>
+            <a:off x="1353405" y="5983718"/>
             <a:ext cx="173621" cy="173621"/>
           </a:xfrm>
           <a:prstGeom prst="ellipse">
@@ -7734,7 +7735,7 @@
         </p:nvSpPr>
         <p:spPr>
           <a:xfrm>
-            <a:off x="548639" y="1611477"/>
+            <a:off x="1288857" y="1611477"/>
             <a:ext cx="173621" cy="173621"/>
           </a:xfrm>
           <a:prstGeom prst="ellipse">
@@ -7792,7 +7793,7 @@
         </p:nvCxnSpPr>
         <p:spPr>
           <a:xfrm rot="10800000">
-            <a:off x="548639" y="1698289"/>
+            <a:off x="1288857" y="1698289"/>
             <a:ext cx="64548" cy="4372241"/>
           </a:xfrm>
           <a:prstGeom prst="curvedConnector3">
@@ -7836,7 +7837,7 @@
         </p:nvSpPr>
         <p:spPr>
           <a:xfrm>
-            <a:off x="621323" y="6162360"/>
+            <a:off x="1361541" y="6162360"/>
             <a:ext cx="173621" cy="173621"/>
           </a:xfrm>
           <a:prstGeom prst="ellipse">
@@ -7890,7 +7891,7 @@
         </p:nvSpPr>
         <p:spPr>
           <a:xfrm>
-            <a:off x="308500" y="3245598"/>
+            <a:off x="1048718" y="3245598"/>
             <a:ext cx="173621" cy="173621"/>
           </a:xfrm>
           <a:prstGeom prst="ellipse">
@@ -7948,7 +7949,7 @@
         </p:nvCxnSpPr>
         <p:spPr>
           <a:xfrm rot="10800000">
-            <a:off x="308501" y="3332409"/>
+            <a:off x="1048719" y="3332409"/>
             <a:ext cx="312823" cy="2916762"/>
           </a:xfrm>
           <a:prstGeom prst="curvedConnector3">
@@ -7992,7 +7993,7 @@
         </p:nvSpPr>
         <p:spPr>
           <a:xfrm>
-            <a:off x="447702" y="3585454"/>
+            <a:off x="1187920" y="3585454"/>
             <a:ext cx="173621" cy="173621"/>
           </a:xfrm>
           <a:prstGeom prst="ellipse">
@@ -8046,7 +8047,7 @@
         </p:nvSpPr>
         <p:spPr>
           <a:xfrm>
-            <a:off x="469624" y="4510210"/>
+            <a:off x="1209842" y="4510210"/>
             <a:ext cx="173621" cy="173621"/>
           </a:xfrm>
           <a:prstGeom prst="ellipse">
@@ -8104,7 +8105,7 @@
         </p:nvCxnSpPr>
         <p:spPr>
           <a:xfrm rot="10800000" flipH="1" flipV="1">
-            <a:off x="447702" y="3672265"/>
+            <a:off x="1187920" y="3672265"/>
             <a:ext cx="21922" cy="924756"/>
           </a:xfrm>
           <a:prstGeom prst="curvedConnector3">
@@ -8148,7 +8149,7 @@
         </p:nvSpPr>
         <p:spPr>
           <a:xfrm>
-            <a:off x="5610016" y="5069660"/>
+            <a:off x="7140808" y="5069660"/>
             <a:ext cx="173621" cy="173621"/>
           </a:xfrm>
           <a:prstGeom prst="ellipse">
@@ -8202,7 +8203,7 @@
         </p:nvSpPr>
         <p:spPr>
           <a:xfrm>
-            <a:off x="8374118" y="551394"/>
+            <a:off x="10501864" y="551394"/>
             <a:ext cx="173621" cy="173621"/>
           </a:xfrm>
           <a:prstGeom prst="ellipse">
@@ -8260,8 +8261,8 @@
         </p:nvCxnSpPr>
         <p:spPr>
           <a:xfrm rot="5400000" flipH="1" flipV="1">
-            <a:off x="4819745" y="1428476"/>
-            <a:ext cx="4518266" cy="2764102"/>
+            <a:off x="6649014" y="1129999"/>
+            <a:ext cx="4518266" cy="3361056"/>
           </a:xfrm>
           <a:prstGeom prst="curvedConnector3">
             <a:avLst>
@@ -8304,7 +8305,7 @@
         </p:nvSpPr>
         <p:spPr>
           <a:xfrm>
-            <a:off x="1250645" y="507115"/>
+            <a:off x="1990863" y="507115"/>
             <a:ext cx="173621" cy="173621"/>
           </a:xfrm>
           <a:prstGeom prst="ellipse">
@@ -8358,7 +8359,7 @@
         </p:nvSpPr>
         <p:spPr>
           <a:xfrm>
-            <a:off x="4571050" y="2511095"/>
+            <a:off x="6101842" y="2511095"/>
             <a:ext cx="173621" cy="173621"/>
           </a:xfrm>
           <a:prstGeom prst="ellipse">
@@ -8416,8 +8417,8 @@
         </p:nvCxnSpPr>
         <p:spPr>
           <a:xfrm>
-            <a:off x="1424266" y="593926"/>
-            <a:ext cx="3233595" cy="1917169"/>
+            <a:off x="2164484" y="593926"/>
+            <a:ext cx="4024169" cy="1917169"/>
           </a:xfrm>
           <a:prstGeom prst="curvedConnector2">
             <a:avLst/>
@@ -8462,8 +8463,8 @@
         </p:nvCxnSpPr>
         <p:spPr>
           <a:xfrm rot="5400000">
-            <a:off x="2240829" y="991598"/>
-            <a:ext cx="723915" cy="4110150"/>
+            <a:off x="3376334" y="596311"/>
+            <a:ext cx="723915" cy="4900724"/>
           </a:xfrm>
           <a:prstGeom prst="curvedConnector3">
             <a:avLst>
@@ -8506,7 +8507,7 @@
         </p:nvSpPr>
         <p:spPr>
           <a:xfrm>
-            <a:off x="460900" y="3408631"/>
+            <a:off x="1201118" y="3408631"/>
             <a:ext cx="173621" cy="173621"/>
           </a:xfrm>
           <a:prstGeom prst="ellipse">
@@ -8560,7 +8561,7 @@
         </p:nvSpPr>
         <p:spPr>
           <a:xfrm>
-            <a:off x="460900" y="4695168"/>
+            <a:off x="1201118" y="4695168"/>
             <a:ext cx="173621" cy="173621"/>
           </a:xfrm>
           <a:prstGeom prst="ellipse">
@@ -8618,8 +8619,8 @@
         </p:nvCxnSpPr>
         <p:spPr>
           <a:xfrm rot="5400000">
-            <a:off x="1597560" y="1721677"/>
-            <a:ext cx="2097263" cy="4023340"/>
+            <a:off x="2733065" y="1326390"/>
+            <a:ext cx="2097263" cy="4813914"/>
           </a:xfrm>
           <a:prstGeom prst="curvedConnector2">
             <a:avLst/>
@@ -8660,7 +8661,7 @@
         </p:nvSpPr>
         <p:spPr>
           <a:xfrm>
-            <a:off x="472506" y="3769753"/>
+            <a:off x="1212724" y="3769753"/>
             <a:ext cx="173621" cy="173621"/>
           </a:xfrm>
           <a:prstGeom prst="ellipse">
@@ -8714,7 +8715,7 @@
         </p:nvSpPr>
         <p:spPr>
           <a:xfrm>
-            <a:off x="465411" y="4879087"/>
+            <a:off x="1205629" y="4879087"/>
             <a:ext cx="173621" cy="173621"/>
           </a:xfrm>
           <a:prstGeom prst="ellipse">
@@ -8772,8 +8773,8 @@
         </p:nvCxnSpPr>
         <p:spPr>
           <a:xfrm flipV="1">
-            <a:off x="646127" y="2597906"/>
-            <a:ext cx="3924923" cy="1258658"/>
+            <a:off x="1386345" y="2597906"/>
+            <a:ext cx="4715497" cy="1258658"/>
           </a:xfrm>
           <a:prstGeom prst="curvedConnector3">
             <a:avLst>
@@ -8820,8 +8821,8 @@
         </p:nvCxnSpPr>
         <p:spPr>
           <a:xfrm flipV="1">
-            <a:off x="639032" y="2597906"/>
-            <a:ext cx="3932018" cy="2367992"/>
+            <a:off x="1379250" y="2597906"/>
+            <a:ext cx="4722592" cy="2367992"/>
           </a:xfrm>
           <a:prstGeom prst="curvedConnector3">
             <a:avLst>

</xml_diff>